<commit_message>
Predictions: - correct the equal sign
</commit_message>
<xml_diff>
--- a/Presentation.pptx
+++ b/Presentation.pptx
@@ -9673,7 +9673,7 @@
                 <a:cs typeface="Arial"/>
                 <a:sym typeface="Arial"/>
               </a:rPr>
-              <a:t>Out of ~60k Invoices predicted, there are 87% of Invoices that predicted as will be late.</a:t>
+              <a:t>Out of ~28k Invoices predicted, there are 55% of Invoices were predicted as will be late.</a:t>
             </a:r>
           </a:p>
         </p:txBody>
@@ -9732,10 +9732,10 @@
       </p:sp>
       <p:pic>
         <p:nvPicPr>
-          <p:cNvPr id="5" name="Picture 4">
+          <p:cNvPr id="3" name="Picture 2">
             <a:extLst>
               <a:ext uri="{FF2B5EF4-FFF2-40B4-BE49-F238E27FC236}">
-                <a16:creationId xmlns:a16="http://schemas.microsoft.com/office/drawing/2014/main" id="{317D0D2C-B73B-3E90-2025-C8301872CBB1}"/>
+                <a16:creationId xmlns:a16="http://schemas.microsoft.com/office/drawing/2014/main" id="{758D8B28-D56B-FC32-7C01-FB2A37C3D7E6}"/>
               </a:ext>
             </a:extLst>
           </p:cNvPr>
@@ -9752,8 +9752,8 @@
         </p:blipFill>
         <p:spPr>
           <a:xfrm>
-            <a:off x="2920947" y="800419"/>
-            <a:ext cx="2712826" cy="2712826"/>
+            <a:off x="2963768" y="795919"/>
+            <a:ext cx="2648275" cy="2648275"/>
           </a:xfrm>
           <a:prstGeom prst="rect">
             <a:avLst/>

</xml_diff>

<commit_message>
review: - improve recommendations & actions
</commit_message>
<xml_diff>
--- a/Presentation.pptx
+++ b/Presentation.pptx
@@ -5,39 +5,48 @@
     <p:sldMasterId id="2147483659" r:id="rId1"/>
   </p:sldMasterIdLst>
   <p:notesMasterIdLst>
-    <p:notesMasterId r:id="rId15"/>
+    <p:notesMasterId r:id="rId17"/>
   </p:notesMasterIdLst>
   <p:sldIdLst>
     <p:sldId id="267" r:id="rId2"/>
-    <p:sldId id="268" r:id="rId3"/>
-    <p:sldId id="256" r:id="rId4"/>
-    <p:sldId id="265" r:id="rId5"/>
-    <p:sldId id="269" r:id="rId6"/>
-    <p:sldId id="273" r:id="rId7"/>
-    <p:sldId id="270" r:id="rId8"/>
-    <p:sldId id="264" r:id="rId9"/>
-    <p:sldId id="257" r:id="rId10"/>
-    <p:sldId id="259" r:id="rId11"/>
-    <p:sldId id="258" r:id="rId12"/>
-    <p:sldId id="263" r:id="rId13"/>
-    <p:sldId id="272" r:id="rId14"/>
+    <p:sldId id="275" r:id="rId3"/>
+    <p:sldId id="268" r:id="rId4"/>
+    <p:sldId id="256" r:id="rId5"/>
+    <p:sldId id="265" r:id="rId6"/>
+    <p:sldId id="269" r:id="rId7"/>
+    <p:sldId id="273" r:id="rId8"/>
+    <p:sldId id="270" r:id="rId9"/>
+    <p:sldId id="264" r:id="rId10"/>
+    <p:sldId id="257" r:id="rId11"/>
+    <p:sldId id="259" r:id="rId12"/>
+    <p:sldId id="258" r:id="rId13"/>
+    <p:sldId id="263" r:id="rId14"/>
+    <p:sldId id="274" r:id="rId15"/>
+    <p:sldId id="272" r:id="rId16"/>
   </p:sldIdLst>
   <p:sldSz cx="9144000" cy="5143500" type="screen16x9"/>
   <p:notesSz cx="6858000" cy="9144000"/>
   <p:embeddedFontLst>
     <p:embeddedFont>
+      <p:font typeface="Consolas" panose="020B0609020204030204" pitchFamily="49" charset="0"/>
+      <p:regular r:id="rId18"/>
+      <p:bold r:id="rId19"/>
+      <p:italic r:id="rId20"/>
+      <p:boldItalic r:id="rId21"/>
+    </p:embeddedFont>
+    <p:embeddedFont>
       <p:font typeface="Lato" panose="020F0502020204030203" pitchFamily="34" charset="0"/>
-      <p:regular r:id="rId16"/>
-      <p:bold r:id="rId17"/>
-      <p:italic r:id="rId18"/>
-      <p:boldItalic r:id="rId19"/>
+      <p:regular r:id="rId22"/>
+      <p:bold r:id="rId23"/>
+      <p:italic r:id="rId24"/>
+      <p:boldItalic r:id="rId25"/>
     </p:embeddedFont>
     <p:embeddedFont>
       <p:font typeface="Raleway" pitchFamily="2" charset="0"/>
-      <p:regular r:id="rId20"/>
-      <p:bold r:id="rId21"/>
-      <p:italic r:id="rId22"/>
-      <p:boldItalic r:id="rId23"/>
+      <p:regular r:id="rId26"/>
+      <p:bold r:id="rId27"/>
+      <p:italic r:id="rId28"/>
+      <p:boldItalic r:id="rId29"/>
     </p:embeddedFont>
   </p:embeddedFontLst>
   <p:defaultTextStyle>
@@ -861,6 +870,110 @@
   <p:cSld>
     <p:spTree>
       <p:nvGrpSpPr>
+        <p:cNvPr id="1" name="Shape 88"/>
+        <p:cNvGrpSpPr/>
+        <p:nvPr/>
+      </p:nvGrpSpPr>
+      <p:grpSpPr>
+        <a:xfrm>
+          <a:off x="0" y="0"/>
+          <a:ext cx="0" cy="0"/>
+          <a:chOff x="0" y="0"/>
+          <a:chExt cx="0" cy="0"/>
+        </a:xfrm>
+      </p:grpSpPr>
+      <p:sp>
+        <p:nvSpPr>
+          <p:cNvPr id="89" name="Google Shape;89;g2fca4b186fb_0_203:notes"/>
+          <p:cNvSpPr>
+            <a:spLocks noGrp="1" noRot="1" noChangeAspect="1"/>
+          </p:cNvSpPr>
+          <p:nvPr>
+            <p:ph type="sldImg" idx="2"/>
+          </p:nvPr>
+        </p:nvSpPr>
+        <p:spPr>
+          <a:xfrm>
+            <a:off x="381000" y="685800"/>
+            <a:ext cx="6096000" cy="3429000"/>
+          </a:xfrm>
+          <a:custGeom>
+            <a:avLst/>
+            <a:gdLst/>
+            <a:ahLst/>
+            <a:cxnLst/>
+            <a:rect l="l" t="t" r="r" b="b"/>
+            <a:pathLst>
+              <a:path w="120000" h="120000" extrusionOk="0">
+                <a:moveTo>
+                  <a:pt x="0" y="0"/>
+                </a:moveTo>
+                <a:lnTo>
+                  <a:pt x="120000" y="0"/>
+                </a:lnTo>
+                <a:lnTo>
+                  <a:pt x="120000" y="120000"/>
+                </a:lnTo>
+                <a:lnTo>
+                  <a:pt x="0" y="120000"/>
+                </a:lnTo>
+                <a:close/>
+              </a:path>
+            </a:pathLst>
+          </a:custGeom>
+        </p:spPr>
+      </p:sp>
+      <p:sp>
+        <p:nvSpPr>
+          <p:cNvPr id="90" name="Google Shape;90;g2fca4b186fb_0_203:notes"/>
+          <p:cNvSpPr txBox="1">
+            <a:spLocks noGrp="1"/>
+          </p:cNvSpPr>
+          <p:nvPr>
+            <p:ph type="body" idx="1"/>
+          </p:nvPr>
+        </p:nvSpPr>
+        <p:spPr>
+          <a:xfrm>
+            <a:off x="685800" y="4343400"/>
+            <a:ext cx="5486400" cy="4114800"/>
+          </a:xfrm>
+          <a:prstGeom prst="rect">
+            <a:avLst/>
+          </a:prstGeom>
+        </p:spPr>
+        <p:txBody>
+          <a:bodyPr spcFirstLastPara="1" wrap="square" lIns="91425" tIns="91425" rIns="91425" bIns="91425" anchor="t" anchorCtr="0">
+            <a:noAutofit/>
+          </a:bodyPr>
+          <a:lstStyle/>
+          <a:p>
+            <a:pPr marL="0" lvl="0" indent="0" algn="l" rtl="0">
+              <a:spcBef>
+                <a:spcPts val="0"/>
+              </a:spcBef>
+              <a:spcAft>
+                <a:spcPts val="0"/>
+              </a:spcAft>
+              <a:buNone/>
+            </a:pPr>
+            <a:endParaRPr/>
+          </a:p>
+        </p:txBody>
+      </p:sp>
+    </p:spTree>
+  </p:cSld>
+  <p:clrMapOvr>
+    <a:masterClrMapping/>
+  </p:clrMapOvr>
+</p:notes>
+</file>
+
+<file path=ppt/notesSlides/notesSlide11.xml><?xml version="1.0" encoding="utf-8"?>
+<p:notes xmlns:a="http://schemas.openxmlformats.org/drawingml/2006/main" xmlns:r="http://schemas.openxmlformats.org/officeDocument/2006/relationships" xmlns:p="http://schemas.openxmlformats.org/presentationml/2006/main" showMasterSp="0" showMasterPhAnim="0">
+  <p:cSld>
+    <p:spTree>
+      <p:nvGrpSpPr>
         <p:cNvPr id="1" name="Shape 101"/>
         <p:cNvGrpSpPr/>
         <p:nvPr/>
@@ -960,7 +1073,7 @@
 </p:notes>
 </file>
 
-<file path=ppt/notesSlides/notesSlide11.xml><?xml version="1.0" encoding="utf-8"?>
+<file path=ppt/notesSlides/notesSlide12.xml><?xml version="1.0" encoding="utf-8"?>
 <p:notes xmlns:a="http://schemas.openxmlformats.org/drawingml/2006/main" xmlns:r="http://schemas.openxmlformats.org/officeDocument/2006/relationships" xmlns:p="http://schemas.openxmlformats.org/presentationml/2006/main" showMasterSp="0" showMasterPhAnim="0">
   <p:cSld>
     <p:spTree>
@@ -1064,7 +1177,7 @@
 </p:notes>
 </file>
 
-<file path=ppt/notesSlides/notesSlide12.xml><?xml version="1.0" encoding="utf-8"?>
+<file path=ppt/notesSlides/notesSlide13.xml><?xml version="1.0" encoding="utf-8"?>
 <p:notes xmlns:a="http://schemas.openxmlformats.org/drawingml/2006/main" xmlns:r="http://schemas.openxmlformats.org/officeDocument/2006/relationships" xmlns:p="http://schemas.openxmlformats.org/presentationml/2006/main" showMasterSp="0" showMasterPhAnim="0">
   <p:cSld>
     <p:spTree>
@@ -1168,7 +1281,116 @@
 </p:notes>
 </file>
 
-<file path=ppt/notesSlides/notesSlide13.xml><?xml version="1.0" encoding="utf-8"?>
+<file path=ppt/notesSlides/notesSlide14.xml><?xml version="1.0" encoding="utf-8"?>
+<p:notes xmlns:a="http://schemas.openxmlformats.org/drawingml/2006/main" xmlns:r="http://schemas.openxmlformats.org/officeDocument/2006/relationships" xmlns:p="http://schemas.openxmlformats.org/presentationml/2006/main" showMasterSp="0" showMasterPhAnim="0">
+  <p:cSld>
+    <p:spTree>
+      <p:nvGrpSpPr>
+        <p:cNvPr id="1" name="Shape 124"/>
+        <p:cNvGrpSpPr/>
+        <p:nvPr/>
+      </p:nvGrpSpPr>
+      <p:grpSpPr>
+        <a:xfrm>
+          <a:off x="0" y="0"/>
+          <a:ext cx="0" cy="0"/>
+          <a:chOff x="0" y="0"/>
+          <a:chExt cx="0" cy="0"/>
+        </a:xfrm>
+      </p:grpSpPr>
+      <p:sp>
+        <p:nvSpPr>
+          <p:cNvPr id="125" name="Google Shape;125;g2fca4b186fb_0_249:notes"/>
+          <p:cNvSpPr>
+            <a:spLocks noGrp="1" noRot="1" noChangeAspect="1"/>
+          </p:cNvSpPr>
+          <p:nvPr>
+            <p:ph type="sldImg" idx="2"/>
+          </p:nvPr>
+        </p:nvSpPr>
+        <p:spPr>
+          <a:xfrm>
+            <a:off x="381000" y="685800"/>
+            <a:ext cx="6096000" cy="3429000"/>
+          </a:xfrm>
+          <a:custGeom>
+            <a:avLst/>
+            <a:gdLst/>
+            <a:ahLst/>
+            <a:cxnLst/>
+            <a:rect l="l" t="t" r="r" b="b"/>
+            <a:pathLst>
+              <a:path w="120000" h="120000" extrusionOk="0">
+                <a:moveTo>
+                  <a:pt x="0" y="0"/>
+                </a:moveTo>
+                <a:lnTo>
+                  <a:pt x="120000" y="0"/>
+                </a:lnTo>
+                <a:lnTo>
+                  <a:pt x="120000" y="120000"/>
+                </a:lnTo>
+                <a:lnTo>
+                  <a:pt x="0" y="120000"/>
+                </a:lnTo>
+                <a:close/>
+              </a:path>
+            </a:pathLst>
+          </a:custGeom>
+        </p:spPr>
+      </p:sp>
+      <p:sp>
+        <p:nvSpPr>
+          <p:cNvPr id="126" name="Google Shape;126;g2fca4b186fb_0_249:notes"/>
+          <p:cNvSpPr txBox="1">
+            <a:spLocks noGrp="1"/>
+          </p:cNvSpPr>
+          <p:nvPr>
+            <p:ph type="body" idx="1"/>
+          </p:nvPr>
+        </p:nvSpPr>
+        <p:spPr>
+          <a:xfrm>
+            <a:off x="685800" y="4343400"/>
+            <a:ext cx="5486400" cy="4114800"/>
+          </a:xfrm>
+          <a:prstGeom prst="rect">
+            <a:avLst/>
+          </a:prstGeom>
+        </p:spPr>
+        <p:txBody>
+          <a:bodyPr spcFirstLastPara="1" wrap="square" lIns="91425" tIns="91425" rIns="91425" bIns="91425" anchor="t" anchorCtr="0">
+            <a:noAutofit/>
+          </a:bodyPr>
+          <a:lstStyle/>
+          <a:p>
+            <a:pPr marL="0" lvl="0" indent="0" algn="l" rtl="0">
+              <a:spcBef>
+                <a:spcPts val="0"/>
+              </a:spcBef>
+              <a:spcAft>
+                <a:spcPts val="0"/>
+              </a:spcAft>
+              <a:buNone/>
+            </a:pPr>
+            <a:endParaRPr/>
+          </a:p>
+        </p:txBody>
+      </p:sp>
+    </p:spTree>
+    <p:extLst>
+      <p:ext uri="{BB962C8B-B14F-4D97-AF65-F5344CB8AC3E}">
+        <p14:creationId xmlns:p14="http://schemas.microsoft.com/office/powerpoint/2010/main" val="3950377255"/>
+      </p:ext>
+    </p:extLst>
+  </p:cSld>
+  <p:clrMapOvr>
+    <a:masterClrMapping/>
+  </p:clrMapOvr>
+</p:notes>
+</file>
+
+<file path=ppt/notesSlides/notesSlide15.xml><?xml version="1.0" encoding="utf-8"?>
 <p:notes xmlns:a="http://schemas.openxmlformats.org/drawingml/2006/main" xmlns:r="http://schemas.openxmlformats.org/officeDocument/2006/relationships" xmlns:p="http://schemas.openxmlformats.org/presentationml/2006/main" showMasterSp="0" showMasterPhAnim="0">
   <p:cSld>
     <p:spTree>
@@ -1300,6 +1522,133 @@
   <p:cSld>
     <p:spTree>
       <p:nvGrpSpPr>
+        <p:cNvPr id="1" name="Shape 82">
+          <a:extLst>
+            <a:ext uri="{FF2B5EF4-FFF2-40B4-BE49-F238E27FC236}">
+              <a16:creationId xmlns:a16="http://schemas.microsoft.com/office/drawing/2014/main" id="{611100B9-0DDF-B781-2343-04D5376A4EC7}"/>
+            </a:ext>
+          </a:extLst>
+        </p:cNvPr>
+        <p:cNvGrpSpPr/>
+        <p:nvPr/>
+      </p:nvGrpSpPr>
+      <p:grpSpPr>
+        <a:xfrm>
+          <a:off x="0" y="0"/>
+          <a:ext cx="0" cy="0"/>
+          <a:chOff x="0" y="0"/>
+          <a:chExt cx="0" cy="0"/>
+        </a:xfrm>
+      </p:grpSpPr>
+      <p:sp>
+        <p:nvSpPr>
+          <p:cNvPr id="83" name="Google Shape;83;p:notes">
+            <a:extLst>
+              <a:ext uri="{FF2B5EF4-FFF2-40B4-BE49-F238E27FC236}">
+                <a16:creationId xmlns:a16="http://schemas.microsoft.com/office/drawing/2014/main" id="{A776ED1E-846C-0FC1-FCE0-4636CA23BD7C}"/>
+              </a:ext>
+            </a:extLst>
+          </p:cNvPr>
+          <p:cNvSpPr>
+            <a:spLocks noGrp="1" noRot="1" noChangeAspect="1"/>
+          </p:cNvSpPr>
+          <p:nvPr>
+            <p:ph type="sldImg" idx="2"/>
+          </p:nvPr>
+        </p:nvSpPr>
+        <p:spPr>
+          <a:xfrm>
+            <a:off x="381000" y="685800"/>
+            <a:ext cx="6096000" cy="3429000"/>
+          </a:xfrm>
+          <a:custGeom>
+            <a:avLst/>
+            <a:gdLst/>
+            <a:ahLst/>
+            <a:cxnLst/>
+            <a:rect l="l" t="t" r="r" b="b"/>
+            <a:pathLst>
+              <a:path w="120000" h="120000" extrusionOk="0">
+                <a:moveTo>
+                  <a:pt x="0" y="0"/>
+                </a:moveTo>
+                <a:lnTo>
+                  <a:pt x="120000" y="0"/>
+                </a:lnTo>
+                <a:lnTo>
+                  <a:pt x="120000" y="120000"/>
+                </a:lnTo>
+                <a:lnTo>
+                  <a:pt x="0" y="120000"/>
+                </a:lnTo>
+                <a:close/>
+              </a:path>
+            </a:pathLst>
+          </a:custGeom>
+        </p:spPr>
+      </p:sp>
+      <p:sp>
+        <p:nvSpPr>
+          <p:cNvPr id="84" name="Google Shape;84;p:notes">
+            <a:extLst>
+              <a:ext uri="{FF2B5EF4-FFF2-40B4-BE49-F238E27FC236}">
+                <a16:creationId xmlns:a16="http://schemas.microsoft.com/office/drawing/2014/main" id="{255A6BA4-0DA6-EBF0-5F49-59B10A441990}"/>
+              </a:ext>
+            </a:extLst>
+          </p:cNvPr>
+          <p:cNvSpPr txBox="1">
+            <a:spLocks noGrp="1"/>
+          </p:cNvSpPr>
+          <p:nvPr>
+            <p:ph type="body" idx="1"/>
+          </p:nvPr>
+        </p:nvSpPr>
+        <p:spPr>
+          <a:xfrm>
+            <a:off x="685800" y="4343400"/>
+            <a:ext cx="5486400" cy="4114800"/>
+          </a:xfrm>
+          <a:prstGeom prst="rect">
+            <a:avLst/>
+          </a:prstGeom>
+        </p:spPr>
+        <p:txBody>
+          <a:bodyPr spcFirstLastPara="1" wrap="square" lIns="91425" tIns="91425" rIns="91425" bIns="91425" anchor="t" anchorCtr="0">
+            <a:noAutofit/>
+          </a:bodyPr>
+          <a:lstStyle/>
+          <a:p>
+            <a:pPr marL="0" lvl="0" indent="0" algn="l" rtl="0">
+              <a:spcBef>
+                <a:spcPts val="0"/>
+              </a:spcBef>
+              <a:spcAft>
+                <a:spcPts val="0"/>
+              </a:spcAft>
+              <a:buNone/>
+            </a:pPr>
+            <a:endParaRPr/>
+          </a:p>
+        </p:txBody>
+      </p:sp>
+    </p:spTree>
+    <p:extLst>
+      <p:ext uri="{BB962C8B-B14F-4D97-AF65-F5344CB8AC3E}">
+        <p14:creationId xmlns:p14="http://schemas.microsoft.com/office/powerpoint/2010/main" val="661096907"/>
+      </p:ext>
+    </p:extLst>
+  </p:cSld>
+  <p:clrMapOvr>
+    <a:masterClrMapping/>
+  </p:clrMapOvr>
+</p:notes>
+</file>
+
+<file path=ppt/notesSlides/notesSlide3.xml><?xml version="1.0" encoding="utf-8"?>
+<p:notes xmlns:a="http://schemas.openxmlformats.org/drawingml/2006/main" xmlns:r="http://schemas.openxmlformats.org/officeDocument/2006/relationships" xmlns:p="http://schemas.openxmlformats.org/presentationml/2006/main" showMasterSp="0" showMasterPhAnim="0">
+  <p:cSld>
+    <p:spTree>
+      <p:nvGrpSpPr>
         <p:cNvPr id="1" name="Shape 88">
           <a:extLst>
             <a:ext uri="{FF2B5EF4-FFF2-40B4-BE49-F238E27FC236}">
@@ -1422,7 +1771,7 @@
 </p:notes>
 </file>
 
-<file path=ppt/notesSlides/notesSlide3.xml><?xml version="1.0" encoding="utf-8"?>
+<file path=ppt/notesSlides/notesSlide4.xml><?xml version="1.0" encoding="utf-8"?>
 <p:notes xmlns:a="http://schemas.openxmlformats.org/drawingml/2006/main" xmlns:r="http://schemas.openxmlformats.org/officeDocument/2006/relationships" xmlns:p="http://schemas.openxmlformats.org/presentationml/2006/main" showMasterSp="0" showMasterPhAnim="0">
   <p:cSld>
     <p:spTree>
@@ -1526,7 +1875,7 @@
 </p:notes>
 </file>
 
-<file path=ppt/notesSlides/notesSlide4.xml><?xml version="1.0" encoding="utf-8"?>
+<file path=ppt/notesSlides/notesSlide5.xml><?xml version="1.0" encoding="utf-8"?>
 <p:notes xmlns:a="http://schemas.openxmlformats.org/drawingml/2006/main" xmlns:r="http://schemas.openxmlformats.org/officeDocument/2006/relationships" xmlns:p="http://schemas.openxmlformats.org/presentationml/2006/main" showMasterSp="0" showMasterPhAnim="0">
   <p:cSld>
     <p:spTree>
@@ -1653,7 +2002,7 @@
 </p:notes>
 </file>
 
-<file path=ppt/notesSlides/notesSlide5.xml><?xml version="1.0" encoding="utf-8"?>
+<file path=ppt/notesSlides/notesSlide6.xml><?xml version="1.0" encoding="utf-8"?>
 <p:notes xmlns:a="http://schemas.openxmlformats.org/drawingml/2006/main" xmlns:r="http://schemas.openxmlformats.org/officeDocument/2006/relationships" xmlns:p="http://schemas.openxmlformats.org/presentationml/2006/main" showMasterSp="0" showMasterPhAnim="0">
   <p:cSld>
     <p:spTree>
@@ -1780,7 +2129,7 @@
 </p:notes>
 </file>
 
-<file path=ppt/notesSlides/notesSlide6.xml><?xml version="1.0" encoding="utf-8"?>
+<file path=ppt/notesSlides/notesSlide7.xml><?xml version="1.0" encoding="utf-8"?>
 <p:notes xmlns:a="http://schemas.openxmlformats.org/drawingml/2006/main" xmlns:r="http://schemas.openxmlformats.org/officeDocument/2006/relationships" xmlns:p="http://schemas.openxmlformats.org/presentationml/2006/main" showMasterSp="0" showMasterPhAnim="0">
   <p:cSld>
     <p:spTree>
@@ -1907,7 +2256,7 @@
 </p:notes>
 </file>
 
-<file path=ppt/notesSlides/notesSlide7.xml><?xml version="1.0" encoding="utf-8"?>
+<file path=ppt/notesSlides/notesSlide8.xml><?xml version="1.0" encoding="utf-8"?>
 <p:notes xmlns:a="http://schemas.openxmlformats.org/drawingml/2006/main" xmlns:r="http://schemas.openxmlformats.org/officeDocument/2006/relationships" xmlns:p="http://schemas.openxmlformats.org/presentationml/2006/main" showMasterSp="0" showMasterPhAnim="0">
   <p:cSld>
     <p:spTree>
@@ -2034,7 +2383,7 @@
 </p:notes>
 </file>
 
-<file path=ppt/notesSlides/notesSlide8.xml><?xml version="1.0" encoding="utf-8"?>
+<file path=ppt/notesSlides/notesSlide9.xml><?xml version="1.0" encoding="utf-8"?>
 <p:notes xmlns:a="http://schemas.openxmlformats.org/drawingml/2006/main" xmlns:r="http://schemas.openxmlformats.org/officeDocument/2006/relationships" xmlns:p="http://schemas.openxmlformats.org/presentationml/2006/main" showMasterSp="0" showMasterPhAnim="0">
   <p:cSld>
     <p:spTree>
@@ -2154,110 +2503,6 @@
         <p14:creationId xmlns:p14="http://schemas.microsoft.com/office/powerpoint/2010/main" val="1029432446"/>
       </p:ext>
     </p:extLst>
-  </p:cSld>
-  <p:clrMapOvr>
-    <a:masterClrMapping/>
-  </p:clrMapOvr>
-</p:notes>
-</file>
-
-<file path=ppt/notesSlides/notesSlide9.xml><?xml version="1.0" encoding="utf-8"?>
-<p:notes xmlns:a="http://schemas.openxmlformats.org/drawingml/2006/main" xmlns:r="http://schemas.openxmlformats.org/officeDocument/2006/relationships" xmlns:p="http://schemas.openxmlformats.org/presentationml/2006/main" showMasterSp="0" showMasterPhAnim="0">
-  <p:cSld>
-    <p:spTree>
-      <p:nvGrpSpPr>
-        <p:cNvPr id="1" name="Shape 88"/>
-        <p:cNvGrpSpPr/>
-        <p:nvPr/>
-      </p:nvGrpSpPr>
-      <p:grpSpPr>
-        <a:xfrm>
-          <a:off x="0" y="0"/>
-          <a:ext cx="0" cy="0"/>
-          <a:chOff x="0" y="0"/>
-          <a:chExt cx="0" cy="0"/>
-        </a:xfrm>
-      </p:grpSpPr>
-      <p:sp>
-        <p:nvSpPr>
-          <p:cNvPr id="89" name="Google Shape;89;g2fca4b186fb_0_203:notes"/>
-          <p:cNvSpPr>
-            <a:spLocks noGrp="1" noRot="1" noChangeAspect="1"/>
-          </p:cNvSpPr>
-          <p:nvPr>
-            <p:ph type="sldImg" idx="2"/>
-          </p:nvPr>
-        </p:nvSpPr>
-        <p:spPr>
-          <a:xfrm>
-            <a:off x="381000" y="685800"/>
-            <a:ext cx="6096000" cy="3429000"/>
-          </a:xfrm>
-          <a:custGeom>
-            <a:avLst/>
-            <a:gdLst/>
-            <a:ahLst/>
-            <a:cxnLst/>
-            <a:rect l="l" t="t" r="r" b="b"/>
-            <a:pathLst>
-              <a:path w="120000" h="120000" extrusionOk="0">
-                <a:moveTo>
-                  <a:pt x="0" y="0"/>
-                </a:moveTo>
-                <a:lnTo>
-                  <a:pt x="120000" y="0"/>
-                </a:lnTo>
-                <a:lnTo>
-                  <a:pt x="120000" y="120000"/>
-                </a:lnTo>
-                <a:lnTo>
-                  <a:pt x="0" y="120000"/>
-                </a:lnTo>
-                <a:close/>
-              </a:path>
-            </a:pathLst>
-          </a:custGeom>
-        </p:spPr>
-      </p:sp>
-      <p:sp>
-        <p:nvSpPr>
-          <p:cNvPr id="90" name="Google Shape;90;g2fca4b186fb_0_203:notes"/>
-          <p:cNvSpPr txBox="1">
-            <a:spLocks noGrp="1"/>
-          </p:cNvSpPr>
-          <p:nvPr>
-            <p:ph type="body" idx="1"/>
-          </p:nvPr>
-        </p:nvSpPr>
-        <p:spPr>
-          <a:xfrm>
-            <a:off x="685800" y="4343400"/>
-            <a:ext cx="5486400" cy="4114800"/>
-          </a:xfrm>
-          <a:prstGeom prst="rect">
-            <a:avLst/>
-          </a:prstGeom>
-        </p:spPr>
-        <p:txBody>
-          <a:bodyPr spcFirstLastPara="1" wrap="square" lIns="91425" tIns="91425" rIns="91425" bIns="91425" anchor="t" anchorCtr="0">
-            <a:noAutofit/>
-          </a:bodyPr>
-          <a:lstStyle/>
-          <a:p>
-            <a:pPr marL="0" lvl="0" indent="0" algn="l" rtl="0">
-              <a:spcBef>
-                <a:spcPts val="0"/>
-              </a:spcBef>
-              <a:spcAft>
-                <a:spcPts val="0"/>
-              </a:spcAft>
-              <a:buNone/>
-            </a:pPr>
-            <a:endParaRPr/>
-          </a:p>
-        </p:txBody>
-      </p:sp>
-    </p:spTree>
   </p:cSld>
   <p:clrMapOvr>
     <a:masterClrMapping/>
@@ -8641,20 +8886,23 @@
           </a:bodyPr>
           <a:lstStyle/>
           <a:p>
-            <a:pPr marL="0" lvl="0" indent="0" algn="l" rtl="0">
-              <a:spcBef>
-                <a:spcPts val="0"/>
-              </a:spcBef>
-              <a:spcAft>
-                <a:spcPts val="0"/>
-              </a:spcAft>
-              <a:buNone/>
-            </a:pPr>
             <a:r>
-              <a:rPr lang="en" dirty="0"/>
-              <a:t>Problem Statements &amp; Assignment Planing</a:t>
+              <a:rPr lang="en-US" b="1" dirty="0">
+                <a:solidFill>
+                  <a:srgbClr val="E06C75"/>
+                </a:solidFill>
+                <a:effectLst/>
+                <a:latin typeface="Raleway" pitchFamily="2" charset="0"/>
+              </a:rPr>
+              <a:t>Option II - E-Commerce &amp; Retail B2B Case Study</a:t>
             </a:r>
-            <a:endParaRPr dirty="0"/>
+            <a:endParaRPr lang="en-US" b="0" dirty="0">
+              <a:solidFill>
+                <a:srgbClr val="BBBBBB"/>
+              </a:solidFill>
+              <a:effectLst/>
+              <a:latin typeface="Raleway" pitchFamily="2" charset="0"/>
+            </a:endParaRPr>
           </a:p>
         </p:txBody>
       </p:sp>
@@ -8720,6 +8968,113 @@
 </file>
 
 <file path=ppt/slides/slide10.xml><?xml version="1.0" encoding="utf-8"?>
+<p:sld xmlns:a="http://schemas.openxmlformats.org/drawingml/2006/main" xmlns:r="http://schemas.openxmlformats.org/officeDocument/2006/relationships" xmlns:p="http://schemas.openxmlformats.org/presentationml/2006/main">
+  <p:cSld>
+    <p:spTree>
+      <p:nvGrpSpPr>
+        <p:cNvPr id="1" name="Shape 91"/>
+        <p:cNvGrpSpPr/>
+        <p:nvPr/>
+      </p:nvGrpSpPr>
+      <p:grpSpPr>
+        <a:xfrm>
+          <a:off x="0" y="0"/>
+          <a:ext cx="0" cy="0"/>
+          <a:chOff x="0" y="0"/>
+          <a:chExt cx="0" cy="0"/>
+        </a:xfrm>
+      </p:grpSpPr>
+      <p:sp>
+        <p:nvSpPr>
+          <p:cNvPr id="94" name="Google Shape;94;p14"/>
+          <p:cNvSpPr/>
+          <p:nvPr/>
+        </p:nvSpPr>
+        <p:spPr>
+          <a:xfrm>
+            <a:off x="215050" y="-5800"/>
+            <a:ext cx="6555900" cy="488100"/>
+          </a:xfrm>
+          <a:prstGeom prst="roundRect">
+            <a:avLst>
+              <a:gd name="adj" fmla="val 16667"/>
+            </a:avLst>
+          </a:prstGeom>
+          <a:solidFill>
+            <a:schemeClr val="lt2"/>
+          </a:solidFill>
+          <a:ln w="9525" cap="flat" cmpd="sng">
+            <a:solidFill>
+              <a:schemeClr val="dk2"/>
+            </a:solidFill>
+            <a:prstDash val="solid"/>
+            <a:round/>
+            <a:headEnd type="none" w="sm" len="sm"/>
+            <a:tailEnd type="none" w="sm" len="sm"/>
+          </a:ln>
+        </p:spPr>
+        <p:txBody>
+          <a:bodyPr spcFirstLastPara="1" wrap="square" lIns="91425" tIns="91425" rIns="91425" bIns="91425" anchor="ctr" anchorCtr="0">
+            <a:noAutofit/>
+          </a:bodyPr>
+          <a:lstStyle/>
+          <a:p>
+            <a:pPr marL="0" lvl="0" indent="0" algn="l" rtl="0">
+              <a:spcBef>
+                <a:spcPts val="0"/>
+              </a:spcBef>
+              <a:spcAft>
+                <a:spcPts val="0"/>
+              </a:spcAft>
+              <a:buNone/>
+            </a:pPr>
+            <a:r>
+              <a:rPr lang="en" sz="3000" b="1"/>
+              <a:t>Test-train split and scaling</a:t>
+            </a:r>
+            <a:endParaRPr sz="3000" b="1"/>
+          </a:p>
+        </p:txBody>
+      </p:sp>
+      <p:pic>
+        <p:nvPicPr>
+          <p:cNvPr id="3" name="Picture 2">
+            <a:extLst>
+              <a:ext uri="{FF2B5EF4-FFF2-40B4-BE49-F238E27FC236}">
+                <a16:creationId xmlns:a16="http://schemas.microsoft.com/office/drawing/2014/main" id="{225A1913-A256-9C96-0FBD-F0E4DD793FC1}"/>
+              </a:ext>
+            </a:extLst>
+          </p:cNvPr>
+          <p:cNvPicPr>
+            <a:picLocks noChangeAspect="1"/>
+          </p:cNvPicPr>
+          <p:nvPr/>
+        </p:nvPicPr>
+        <p:blipFill>
+          <a:blip r:embed="rId3"/>
+          <a:stretch>
+            <a:fillRect/>
+          </a:stretch>
+        </p:blipFill>
+        <p:spPr>
+          <a:xfrm>
+            <a:off x="1311734" y="1435945"/>
+            <a:ext cx="5373546" cy="3540053"/>
+          </a:xfrm>
+          <a:prstGeom prst="rect">
+            <a:avLst/>
+          </a:prstGeom>
+        </p:spPr>
+      </p:pic>
+    </p:spTree>
+  </p:cSld>
+  <p:clrMapOvr>
+    <a:masterClrMapping/>
+  </p:clrMapOvr>
+</p:sld>
+</file>
+
+<file path=ppt/slides/slide11.xml><?xml version="1.0" encoding="utf-8"?>
 <p:sld xmlns:a="http://schemas.openxmlformats.org/drawingml/2006/main" xmlns:r="http://schemas.openxmlformats.org/officeDocument/2006/relationships" xmlns:p="http://schemas.openxmlformats.org/presentationml/2006/main">
   <p:cSld>
     <p:spTree>
@@ -8895,7 +9250,7 @@
 </p:sld>
 </file>
 
-<file path=ppt/slides/slide11.xml><?xml version="1.0" encoding="utf-8"?>
+<file path=ppt/slides/slide12.xml><?xml version="1.0" encoding="utf-8"?>
 <p:sld xmlns:a="http://schemas.openxmlformats.org/drawingml/2006/main" xmlns:r="http://schemas.openxmlformats.org/officeDocument/2006/relationships" xmlns:p="http://schemas.openxmlformats.org/presentationml/2006/main">
   <p:cSld>
     <p:spTree>
@@ -9613,7 +9968,7 @@
 </p:sld>
 </file>
 
-<file path=ppt/slides/slide12.xml><?xml version="1.0" encoding="utf-8"?>
+<file path=ppt/slides/slide13.xml><?xml version="1.0" encoding="utf-8"?>
 <p:sld xmlns:a="http://schemas.openxmlformats.org/drawingml/2006/main" xmlns:r="http://schemas.openxmlformats.org/officeDocument/2006/relationships" xmlns:p="http://schemas.openxmlformats.org/presentationml/2006/main">
   <p:cSld>
     <p:spTree>
@@ -9768,7 +10123,501 @@
 </p:sld>
 </file>
 
-<file path=ppt/slides/slide13.xml><?xml version="1.0" encoding="utf-8"?>
+<file path=ppt/slides/slide14.xml><?xml version="1.0" encoding="utf-8"?>
+<p:sld xmlns:a="http://schemas.openxmlformats.org/drawingml/2006/main" xmlns:r="http://schemas.openxmlformats.org/officeDocument/2006/relationships" xmlns:p="http://schemas.openxmlformats.org/presentationml/2006/main">
+  <p:cSld>
+    <p:spTree>
+      <p:nvGrpSpPr>
+        <p:cNvPr id="1" name="Shape 127"/>
+        <p:cNvGrpSpPr/>
+        <p:nvPr/>
+      </p:nvGrpSpPr>
+      <p:grpSpPr>
+        <a:xfrm>
+          <a:off x="0" y="0"/>
+          <a:ext cx="0" cy="0"/>
+          <a:chOff x="0" y="0"/>
+          <a:chExt cx="0" cy="0"/>
+        </a:xfrm>
+      </p:grpSpPr>
+      <p:sp>
+        <p:nvSpPr>
+          <p:cNvPr id="129" name="Google Shape;129;p20"/>
+          <p:cNvSpPr/>
+          <p:nvPr/>
+        </p:nvSpPr>
+        <p:spPr>
+          <a:xfrm>
+            <a:off x="215050" y="-5800"/>
+            <a:ext cx="6555900" cy="488100"/>
+          </a:xfrm>
+          <a:prstGeom prst="roundRect">
+            <a:avLst>
+              <a:gd name="adj" fmla="val 16667"/>
+            </a:avLst>
+          </a:prstGeom>
+          <a:solidFill>
+            <a:schemeClr val="lt2"/>
+          </a:solidFill>
+          <a:ln w="9525" cap="flat" cmpd="sng">
+            <a:solidFill>
+              <a:schemeClr val="dk2"/>
+            </a:solidFill>
+            <a:prstDash val="solid"/>
+            <a:round/>
+            <a:headEnd type="none" w="sm" len="sm"/>
+            <a:tailEnd type="none" w="sm" len="sm"/>
+          </a:ln>
+        </p:spPr>
+        <p:txBody>
+          <a:bodyPr spcFirstLastPara="1" wrap="square" lIns="91425" tIns="91425" rIns="91425" bIns="91425" anchor="ctr" anchorCtr="0">
+            <a:noAutofit/>
+          </a:bodyPr>
+          <a:lstStyle/>
+          <a:p>
+            <a:pPr marL="0" lvl="0" indent="0" algn="l" rtl="0">
+              <a:spcBef>
+                <a:spcPts val="0"/>
+              </a:spcBef>
+              <a:spcAft>
+                <a:spcPts val="0"/>
+              </a:spcAft>
+              <a:buNone/>
+            </a:pPr>
+            <a:r>
+              <a:rPr lang="en" sz="3000" b="1" dirty="0"/>
+              <a:t>Recommendations</a:t>
+            </a:r>
+            <a:endParaRPr sz="3000" b="1" dirty="0"/>
+          </a:p>
+        </p:txBody>
+      </p:sp>
+      <p:sp>
+        <p:nvSpPr>
+          <p:cNvPr id="4" name="Title 3">
+            <a:extLst>
+              <a:ext uri="{FF2B5EF4-FFF2-40B4-BE49-F238E27FC236}">
+                <a16:creationId xmlns:a16="http://schemas.microsoft.com/office/drawing/2014/main" id="{9B65A196-D5B8-0F28-AC12-161B5697D543}"/>
+              </a:ext>
+            </a:extLst>
+          </p:cNvPr>
+          <p:cNvSpPr>
+            <a:spLocks noGrp="1"/>
+          </p:cNvSpPr>
+          <p:nvPr>
+            <p:ph type="title"/>
+          </p:nvPr>
+        </p:nvSpPr>
+        <p:spPr>
+          <a:xfrm>
+            <a:off x="571038" y="607942"/>
+            <a:ext cx="8132998" cy="4389847"/>
+          </a:xfrm>
+        </p:spPr>
+        <p:txBody>
+          <a:bodyPr>
+            <a:normAutofit fontScale="90000"/>
+          </a:bodyPr>
+          <a:lstStyle/>
+          <a:p>
+            <a:pPr>
+              <a:lnSpc>
+                <a:spcPct val="200000"/>
+              </a:lnSpc>
+            </a:pPr>
+            <a:r>
+              <a:rPr lang="en-US" sz="1800" i="1" dirty="0">
+                <a:solidFill>
+                  <a:srgbClr val="091E42"/>
+                </a:solidFill>
+                <a:effectLst/>
+                <a:latin typeface="Raleway" pitchFamily="2" charset="0"/>
+              </a:rPr>
+              <a:t>Schuster should </a:t>
+            </a:r>
+            <a:r>
+              <a:rPr lang="en-US" sz="1800" i="1" u="sng" dirty="0">
+                <a:solidFill>
+                  <a:srgbClr val="091E42"/>
+                </a:solidFill>
+                <a:effectLst/>
+                <a:latin typeface="Raleway" pitchFamily="2" charset="0"/>
+              </a:rPr>
+              <a:t>actively push and chase vendors </a:t>
+            </a:r>
+            <a:r>
+              <a:rPr lang="en-US" sz="1800" i="1" dirty="0">
+                <a:solidFill>
+                  <a:srgbClr val="091E42"/>
+                </a:solidFill>
+                <a:effectLst/>
+                <a:latin typeface="Raleway" pitchFamily="2" charset="0"/>
+              </a:rPr>
+              <a:t>with the following characteristics:</a:t>
+            </a:r>
+            <a:br>
+              <a:rPr lang="en-US" sz="1800" i="1" dirty="0">
+                <a:solidFill>
+                  <a:srgbClr val="091E42"/>
+                </a:solidFill>
+                <a:effectLst/>
+                <a:latin typeface="Raleway" pitchFamily="2" charset="0"/>
+              </a:rPr>
+            </a:br>
+            <a:r>
+              <a:rPr lang="en-US" sz="1800" b="0" i="0" dirty="0">
+                <a:solidFill>
+                  <a:srgbClr val="091E42"/>
+                </a:solidFill>
+                <a:effectLst/>
+                <a:latin typeface="Raleway" pitchFamily="2" charset="0"/>
+              </a:rPr>
+              <a:t>1. The </a:t>
+            </a:r>
+            <a:r>
+              <a:rPr lang="en-US" sz="1800" i="0" dirty="0">
+                <a:solidFill>
+                  <a:srgbClr val="091E42"/>
+                </a:solidFill>
+                <a:effectLst/>
+                <a:latin typeface="Raleway" pitchFamily="2" charset="0"/>
+              </a:rPr>
+              <a:t>currency</a:t>
+            </a:r>
+            <a:r>
+              <a:rPr lang="en-US" sz="1800" b="0" i="0" dirty="0">
+                <a:solidFill>
+                  <a:srgbClr val="091E42"/>
+                </a:solidFill>
+                <a:effectLst/>
+                <a:latin typeface="Raleway" pitchFamily="2" charset="0"/>
+              </a:rPr>
+              <a:t> they used for transaction are </a:t>
+            </a:r>
+            <a:r>
+              <a:rPr lang="en-US" sz="1800" i="0" dirty="0">
+                <a:solidFill>
+                  <a:srgbClr val="091E42"/>
+                </a:solidFill>
+                <a:effectLst/>
+                <a:latin typeface="Raleway" pitchFamily="2" charset="0"/>
+              </a:rPr>
+              <a:t>SAR</a:t>
+            </a:r>
+            <a:r>
+              <a:rPr lang="en-US" sz="1800" b="0" i="0" dirty="0">
+                <a:solidFill>
+                  <a:srgbClr val="091E42"/>
+                </a:solidFill>
+                <a:effectLst/>
+                <a:latin typeface="Raleway" pitchFamily="2" charset="0"/>
+              </a:rPr>
+              <a:t> or </a:t>
+            </a:r>
+            <a:r>
+              <a:rPr lang="en-US" sz="1800" i="0" dirty="0">
+                <a:solidFill>
+                  <a:srgbClr val="091E42"/>
+                </a:solidFill>
+                <a:effectLst/>
+                <a:latin typeface="Raleway" pitchFamily="2" charset="0"/>
+              </a:rPr>
+              <a:t>USD.</a:t>
+            </a:r>
+            <a:br>
+              <a:rPr lang="en-US" sz="1800" b="0" i="0" dirty="0">
+                <a:solidFill>
+                  <a:srgbClr val="091E42"/>
+                </a:solidFill>
+                <a:effectLst/>
+                <a:latin typeface="Raleway" pitchFamily="2" charset="0"/>
+              </a:rPr>
+            </a:br>
+            <a:r>
+              <a:rPr lang="en-US" sz="1800" b="0" i="0" dirty="0">
+                <a:solidFill>
+                  <a:srgbClr val="091E42"/>
+                </a:solidFill>
+                <a:effectLst/>
+                <a:latin typeface="Raleway" pitchFamily="2" charset="0"/>
+              </a:rPr>
+              <a:t>2. Vendors who belong to </a:t>
+            </a:r>
+            <a:r>
+              <a:rPr lang="en-US" sz="1800" i="0" dirty="0">
+                <a:solidFill>
+                  <a:srgbClr val="091E42"/>
+                </a:solidFill>
+                <a:effectLst/>
+                <a:latin typeface="Raleway" pitchFamily="2" charset="0"/>
+              </a:rPr>
+              <a:t>segment id 2 or 3.</a:t>
+            </a:r>
+            <a:br>
+              <a:rPr lang="en-US" sz="1800" i="0" dirty="0">
+                <a:solidFill>
+                  <a:srgbClr val="091E42"/>
+                </a:solidFill>
+                <a:effectLst/>
+                <a:latin typeface="Raleway" pitchFamily="2" charset="0"/>
+              </a:rPr>
+            </a:br>
+            <a:r>
+              <a:rPr lang="en-US" sz="1800" b="0" i="0" dirty="0">
+                <a:solidFill>
+                  <a:srgbClr val="091E42"/>
+                </a:solidFill>
+                <a:effectLst/>
+                <a:latin typeface="Raleway" pitchFamily="2" charset="0"/>
+              </a:rPr>
+              <a:t>3. Have invoices with </a:t>
+            </a:r>
+            <a:r>
+              <a:rPr lang="en-US" sz="1800" i="0" dirty="0">
+                <a:solidFill>
+                  <a:srgbClr val="091E42"/>
+                </a:solidFill>
+                <a:effectLst/>
+                <a:latin typeface="Raleway" pitchFamily="2" charset="0"/>
+              </a:rPr>
+              <a:t>payment terms below </a:t>
+            </a:r>
+            <a:r>
+              <a:rPr lang="en-US" sz="1800" dirty="0">
+                <a:solidFill>
+                  <a:srgbClr val="091E42"/>
+                </a:solidFill>
+                <a:latin typeface="Raleway" pitchFamily="2" charset="0"/>
+              </a:rPr>
+              <a:t>4</a:t>
+            </a:r>
+            <a:r>
+              <a:rPr lang="en-US" sz="1800" i="0" dirty="0">
+                <a:solidFill>
+                  <a:srgbClr val="091E42"/>
+                </a:solidFill>
+                <a:effectLst/>
+                <a:latin typeface="Raleway" pitchFamily="2" charset="0"/>
+              </a:rPr>
+              <a:t>0~50 days </a:t>
+            </a:r>
+            <a:r>
+              <a:rPr lang="en-US" sz="1800" b="0" i="0" dirty="0">
+                <a:solidFill>
+                  <a:srgbClr val="091E42"/>
+                </a:solidFill>
+                <a:effectLst/>
+                <a:latin typeface="Raleway" pitchFamily="2" charset="0"/>
+              </a:rPr>
+              <a:t>since the invoice is issued.</a:t>
+            </a:r>
+            <a:br>
+              <a:rPr lang="en-US" sz="1800" b="0" i="0" dirty="0">
+                <a:solidFill>
+                  <a:srgbClr val="091E42"/>
+                </a:solidFill>
+                <a:effectLst/>
+                <a:latin typeface="Raleway" pitchFamily="2" charset="0"/>
+              </a:rPr>
+            </a:br>
+            <a:r>
+              <a:rPr lang="en-US" sz="1800" b="0" i="0" dirty="0">
+                <a:solidFill>
+                  <a:srgbClr val="091E42"/>
+                </a:solidFill>
+                <a:effectLst/>
+                <a:latin typeface="Raleway" pitchFamily="2" charset="0"/>
+              </a:rPr>
+              <a:t>4. Have </a:t>
+            </a:r>
+            <a:r>
+              <a:rPr lang="en-US" sz="1800" i="0" dirty="0">
+                <a:solidFill>
+                  <a:srgbClr val="091E42"/>
+                </a:solidFill>
+                <a:effectLst/>
+                <a:latin typeface="Raleway" pitchFamily="2" charset="0"/>
+              </a:rPr>
+              <a:t>invoices issued during Autumn </a:t>
+            </a:r>
+            <a:r>
+              <a:rPr lang="en-US" sz="1800" b="0" i="0" dirty="0">
+                <a:solidFill>
+                  <a:srgbClr val="091E42"/>
+                </a:solidFill>
+                <a:effectLst/>
+                <a:latin typeface="Raleway" pitchFamily="2" charset="0"/>
+              </a:rPr>
+              <a:t>period (or </a:t>
+            </a:r>
+            <a:r>
+              <a:rPr lang="en-US" sz="1800" i="0" dirty="0">
+                <a:solidFill>
+                  <a:srgbClr val="091E42"/>
+                </a:solidFill>
+                <a:effectLst/>
+                <a:latin typeface="Raleway" pitchFamily="2" charset="0"/>
+              </a:rPr>
+              <a:t>Due during Winter</a:t>
+            </a:r>
+            <a:r>
+              <a:rPr lang="en-US" sz="1800" b="0" i="0" dirty="0">
+                <a:solidFill>
+                  <a:srgbClr val="091E42"/>
+                </a:solidFill>
+                <a:effectLst/>
+                <a:latin typeface="Raleway" pitchFamily="2" charset="0"/>
+              </a:rPr>
+              <a:t> period).</a:t>
+            </a:r>
+            <a:br>
+              <a:rPr lang="en-US" sz="1800" b="0" i="0" dirty="0">
+                <a:solidFill>
+                  <a:srgbClr val="091E42"/>
+                </a:solidFill>
+                <a:effectLst/>
+                <a:latin typeface="Raleway" pitchFamily="2" charset="0"/>
+              </a:rPr>
+            </a:br>
+            <a:r>
+              <a:rPr lang="en-US" sz="1800" b="0" i="0" dirty="0">
+                <a:solidFill>
+                  <a:srgbClr val="091E42"/>
+                </a:solidFill>
+                <a:effectLst/>
+                <a:latin typeface="Raleway" pitchFamily="2" charset="0"/>
+              </a:rPr>
+              <a:t>5. Have </a:t>
+            </a:r>
+            <a:r>
+              <a:rPr lang="en-US" sz="1800" i="0" dirty="0">
+                <a:solidFill>
+                  <a:srgbClr val="091E42"/>
+                </a:solidFill>
+                <a:effectLst/>
+                <a:latin typeface="Raleway" pitchFamily="2" charset="0"/>
+              </a:rPr>
+              <a:t>invoices classes</a:t>
+            </a:r>
+            <a:r>
+              <a:rPr lang="en-US" sz="1800" b="0" i="0" dirty="0">
+                <a:solidFill>
+                  <a:srgbClr val="091E42"/>
+                </a:solidFill>
+                <a:effectLst/>
+                <a:latin typeface="Raleway" pitchFamily="2" charset="0"/>
+              </a:rPr>
+              <a:t> other than “INV”.</a:t>
+            </a:r>
+            <a:br>
+              <a:rPr lang="en-US" sz="1800" b="0" i="0" dirty="0">
+                <a:solidFill>
+                  <a:srgbClr val="091E42"/>
+                </a:solidFill>
+                <a:effectLst/>
+                <a:latin typeface="Raleway" pitchFamily="2" charset="0"/>
+              </a:rPr>
+            </a:br>
+            <a:r>
+              <a:rPr lang="en-US" sz="1800" b="0" i="0" dirty="0">
+                <a:solidFill>
+                  <a:srgbClr val="091E42"/>
+                </a:solidFill>
+                <a:effectLst/>
+                <a:latin typeface="Raleway" pitchFamily="2" charset="0"/>
+              </a:rPr>
+              <a:t>6. Have </a:t>
+            </a:r>
+            <a:r>
+              <a:rPr lang="en-US" sz="1800" i="0" dirty="0">
+                <a:solidFill>
+                  <a:srgbClr val="091E42"/>
+                </a:solidFill>
+                <a:effectLst/>
+                <a:latin typeface="Raleway" pitchFamily="2" charset="0"/>
+              </a:rPr>
+              <a:t>invoices predicted as late payment </a:t>
+            </a:r>
+            <a:r>
+              <a:rPr lang="en-US" sz="1800" b="0" i="0" dirty="0">
+                <a:solidFill>
+                  <a:srgbClr val="091E42"/>
+                </a:solidFill>
+                <a:effectLst/>
+                <a:latin typeface="Raleway" pitchFamily="2" charset="0"/>
+              </a:rPr>
+              <a:t>in the </a:t>
+            </a:r>
+            <a:r>
+              <a:rPr lang="en-US" sz="1800" b="0" i="0" dirty="0">
+                <a:solidFill>
+                  <a:srgbClr val="091E42"/>
+                </a:solidFill>
+                <a:effectLst/>
+                <a:latin typeface="Consolas" panose="020B0609020204030204" pitchFamily="49" charset="0"/>
+              </a:rPr>
+              <a:t>‘</a:t>
+            </a:r>
+            <a:r>
+              <a:rPr lang="en-US" sz="1800" b="0" i="0" dirty="0" err="1">
+                <a:solidFill>
+                  <a:srgbClr val="091E42"/>
+                </a:solidFill>
+                <a:effectLst/>
+                <a:latin typeface="Consolas" panose="020B0609020204030204" pitchFamily="49" charset="0"/>
+              </a:rPr>
+              <a:t>open_pred_df</a:t>
+            </a:r>
+            <a:r>
+              <a:rPr lang="en-US" sz="1800" b="0" i="0" dirty="0">
+                <a:solidFill>
+                  <a:srgbClr val="091E42"/>
+                </a:solidFill>
+                <a:effectLst/>
+                <a:latin typeface="Consolas" panose="020B0609020204030204" pitchFamily="49" charset="0"/>
+              </a:rPr>
+              <a:t>’ </a:t>
+            </a:r>
+            <a:r>
+              <a:rPr lang="en-US" sz="1800" b="0" i="0" dirty="0" err="1">
+                <a:solidFill>
+                  <a:srgbClr val="091E42"/>
+                </a:solidFill>
+                <a:effectLst/>
+                <a:latin typeface="Raleway" pitchFamily="2" charset="0"/>
+              </a:rPr>
+              <a:t>dataframe</a:t>
+            </a:r>
+            <a:r>
+              <a:rPr lang="en-US" sz="1800" b="0" i="0" dirty="0">
+                <a:solidFill>
+                  <a:srgbClr val="091E42"/>
+                </a:solidFill>
+                <a:effectLst/>
+                <a:latin typeface="Raleway" pitchFamily="2" charset="0"/>
+              </a:rPr>
+              <a:t>.</a:t>
+            </a:r>
+            <a:endParaRPr lang="en-US" sz="1800" dirty="0">
+              <a:latin typeface="Raleway" pitchFamily="2" charset="0"/>
+            </a:endParaRPr>
+          </a:p>
+        </p:txBody>
+      </p:sp>
+    </p:spTree>
+    <p:extLst>
+      <p:ext uri="{BB962C8B-B14F-4D97-AF65-F5344CB8AC3E}">
+        <p14:creationId xmlns:p14="http://schemas.microsoft.com/office/powerpoint/2010/main" val="636772886"/>
+      </p:ext>
+    </p:extLst>
+  </p:cSld>
+  <p:clrMapOvr>
+    <a:masterClrMapping/>
+  </p:clrMapOvr>
+</p:sld>
+</file>
+
+<file path=ppt/slides/slide15.xml><?xml version="1.0" encoding="utf-8"?>
 <p:sld xmlns:a="http://schemas.openxmlformats.org/drawingml/2006/main" xmlns:r="http://schemas.openxmlformats.org/officeDocument/2006/relationships" xmlns:p="http://schemas.openxmlformats.org/presentationml/2006/main">
   <p:cSld>
     <p:spTree>
@@ -9887,6 +10736,138 @@
 </file>
 
 <file path=ppt/slides/slide2.xml><?xml version="1.0" encoding="utf-8"?>
+<p:sld xmlns:a="http://schemas.openxmlformats.org/drawingml/2006/main" xmlns:r="http://schemas.openxmlformats.org/officeDocument/2006/relationships" xmlns:p="http://schemas.openxmlformats.org/presentationml/2006/main">
+  <p:cSld>
+    <p:spTree>
+      <p:nvGrpSpPr>
+        <p:cNvPr id="1" name="Shape 85">
+          <a:extLst>
+            <a:ext uri="{FF2B5EF4-FFF2-40B4-BE49-F238E27FC236}">
+              <a16:creationId xmlns:a16="http://schemas.microsoft.com/office/drawing/2014/main" id="{1AFB8350-922F-7B60-992A-8C671A9618E0}"/>
+            </a:ext>
+          </a:extLst>
+        </p:cNvPr>
+        <p:cNvGrpSpPr/>
+        <p:nvPr/>
+      </p:nvGrpSpPr>
+      <p:grpSpPr>
+        <a:xfrm>
+          <a:off x="0" y="0"/>
+          <a:ext cx="0" cy="0"/>
+          <a:chOff x="0" y="0"/>
+          <a:chExt cx="0" cy="0"/>
+        </a:xfrm>
+      </p:grpSpPr>
+      <p:sp>
+        <p:nvSpPr>
+          <p:cNvPr id="86" name="Google Shape;86;p13">
+            <a:extLst>
+              <a:ext uri="{FF2B5EF4-FFF2-40B4-BE49-F238E27FC236}">
+                <a16:creationId xmlns:a16="http://schemas.microsoft.com/office/drawing/2014/main" id="{490B7782-9306-D432-7AD3-D4A913CB2010}"/>
+              </a:ext>
+            </a:extLst>
+          </p:cNvPr>
+          <p:cNvSpPr txBox="1">
+            <a:spLocks noGrp="1"/>
+          </p:cNvSpPr>
+          <p:nvPr>
+            <p:ph type="ctrTitle"/>
+          </p:nvPr>
+        </p:nvSpPr>
+        <p:spPr>
+          <a:xfrm>
+            <a:off x="729450" y="1322450"/>
+            <a:ext cx="7688100" cy="1664700"/>
+          </a:xfrm>
+          <a:prstGeom prst="rect">
+            <a:avLst/>
+          </a:prstGeom>
+        </p:spPr>
+        <p:txBody>
+          <a:bodyPr spcFirstLastPara="1" wrap="square" lIns="91425" tIns="91425" rIns="91425" bIns="91425" anchor="t" anchorCtr="0">
+            <a:normAutofit/>
+          </a:bodyPr>
+          <a:lstStyle/>
+          <a:p>
+            <a:pPr marL="0" lvl="0" indent="0" algn="l" rtl="0">
+              <a:spcBef>
+                <a:spcPts val="0"/>
+              </a:spcBef>
+              <a:spcAft>
+                <a:spcPts val="0"/>
+              </a:spcAft>
+              <a:buNone/>
+            </a:pPr>
+            <a:r>
+              <a:rPr lang="en" dirty="0"/>
+              <a:t>Problem Statements &amp; Assignment Planing</a:t>
+            </a:r>
+            <a:endParaRPr dirty="0"/>
+          </a:p>
+        </p:txBody>
+      </p:sp>
+      <p:sp>
+        <p:nvSpPr>
+          <p:cNvPr id="87" name="Google Shape;87;p13">
+            <a:extLst>
+              <a:ext uri="{FF2B5EF4-FFF2-40B4-BE49-F238E27FC236}">
+                <a16:creationId xmlns:a16="http://schemas.microsoft.com/office/drawing/2014/main" id="{DAD8DD24-5207-ABE2-4C5F-794B4F551D35}"/>
+              </a:ext>
+            </a:extLst>
+          </p:cNvPr>
+          <p:cNvSpPr txBox="1">
+            <a:spLocks noGrp="1"/>
+          </p:cNvSpPr>
+          <p:nvPr>
+            <p:ph type="subTitle" idx="1"/>
+          </p:nvPr>
+        </p:nvSpPr>
+        <p:spPr>
+          <a:xfrm>
+            <a:off x="729627" y="3172900"/>
+            <a:ext cx="7688100" cy="1744540"/>
+          </a:xfrm>
+          <a:prstGeom prst="rect">
+            <a:avLst/>
+          </a:prstGeom>
+        </p:spPr>
+        <p:txBody>
+          <a:bodyPr spcFirstLastPara="1" wrap="square" lIns="91425" tIns="91425" rIns="91425" bIns="91425" anchor="t" anchorCtr="0">
+            <a:normAutofit/>
+          </a:bodyPr>
+          <a:lstStyle/>
+          <a:p>
+            <a:pPr marL="0" lvl="0" indent="0" algn="l" rtl="0">
+              <a:spcBef>
+                <a:spcPts val="0"/>
+              </a:spcBef>
+              <a:spcAft>
+                <a:spcPts val="0"/>
+              </a:spcAft>
+              <a:buNone/>
+            </a:pPr>
+            <a:r>
+              <a:rPr lang="en" dirty="0"/>
+              <a:t>NGUYEN HUU LIEM</a:t>
+            </a:r>
+            <a:endParaRPr dirty="0"/>
+          </a:p>
+        </p:txBody>
+      </p:sp>
+    </p:spTree>
+    <p:extLst>
+      <p:ext uri="{BB962C8B-B14F-4D97-AF65-F5344CB8AC3E}">
+        <p14:creationId xmlns:p14="http://schemas.microsoft.com/office/powerpoint/2010/main" val="687054196"/>
+      </p:ext>
+    </p:extLst>
+  </p:cSld>
+  <p:clrMapOvr>
+    <a:masterClrMapping/>
+  </p:clrMapOvr>
+</p:sld>
+</file>
+
+<file path=ppt/slides/slide3.xml><?xml version="1.0" encoding="utf-8"?>
 <p:sld xmlns:a="http://schemas.openxmlformats.org/drawingml/2006/main" xmlns:r="http://schemas.openxmlformats.org/officeDocument/2006/relationships" xmlns:p="http://schemas.openxmlformats.org/presentationml/2006/main">
   <p:cSld>
     <p:spTree>
@@ -10166,7 +11147,7 @@
 </p:sld>
 </file>
 
-<file path=ppt/slides/slide3.xml><?xml version="1.0" encoding="utf-8"?>
+<file path=ppt/slides/slide4.xml><?xml version="1.0" encoding="utf-8"?>
 <p:sld xmlns:a="http://schemas.openxmlformats.org/drawingml/2006/main" xmlns:r="http://schemas.openxmlformats.org/officeDocument/2006/relationships" xmlns:p="http://schemas.openxmlformats.org/presentationml/2006/main">
   <p:cSld>
     <p:spTree>
@@ -10275,7 +11256,7 @@
 </p:sld>
 </file>
 
-<file path=ppt/slides/slide4.xml><?xml version="1.0" encoding="utf-8"?>
+<file path=ppt/slides/slide5.xml><?xml version="1.0" encoding="utf-8"?>
 <p:sld xmlns:a="http://schemas.openxmlformats.org/drawingml/2006/main" xmlns:r="http://schemas.openxmlformats.org/officeDocument/2006/relationships" xmlns:p="http://schemas.openxmlformats.org/presentationml/2006/main">
   <p:cSld>
     <p:spTree>
@@ -10317,7 +11298,7 @@
         <p:spPr>
           <a:xfrm>
             <a:off x="1232748" y="1088388"/>
-            <a:ext cx="6746240" cy="4127078"/>
+            <a:ext cx="6746240" cy="3134604"/>
           </a:xfrm>
           <a:prstGeom prst="rect">
             <a:avLst/>
@@ -10348,25 +11329,7 @@
                 <a:cs typeface="Arial"/>
                 <a:sym typeface="Arial"/>
               </a:rPr>
-              <a:t>- Remove </a:t>
-            </a:r>
-            <a:r>
-              <a:rPr lang="en-US" sz="1400" b="0" dirty="0" err="1">
-                <a:latin typeface="Arial"/>
-                <a:ea typeface="Arial"/>
-                <a:cs typeface="Arial"/>
-                <a:sym typeface="Arial"/>
-              </a:rPr>
-              <a:t>unecessary</a:t>
-            </a:r>
-            <a:r>
-              <a:rPr lang="en-US" sz="1400" b="0" dirty="0">
-                <a:latin typeface="Arial"/>
-                <a:ea typeface="Arial"/>
-                <a:cs typeface="Arial"/>
-                <a:sym typeface="Arial"/>
-              </a:rPr>
-              <a:t> columns based on the Data Dictionary- Drop cols with just a single variable</a:t>
+              <a:t>- Remove unnecessary columns based on the Data Dictionary</a:t>
             </a:r>
             <a:br>
               <a:rPr lang="en-US" sz="1400" b="0" dirty="0">
@@ -10383,7 +11346,7 @@
                 <a:cs typeface="Arial"/>
                 <a:sym typeface="Arial"/>
               </a:rPr>
-              <a:t>-  format date variables</a:t>
+              <a:t>- Drop cols with just a single variable</a:t>
             </a:r>
             <a:br>
               <a:rPr lang="en-US" sz="1400" b="0" dirty="0">
@@ -10400,7 +11363,24 @@
                 <a:cs typeface="Arial"/>
                 <a:sym typeface="Arial"/>
               </a:rPr>
-              <a:t>- calculate TARGET variable</a:t>
+              <a:t>- Format date variables</a:t>
+            </a:r>
+            <a:br>
+              <a:rPr lang="en-US" sz="1400" b="0" dirty="0">
+                <a:latin typeface="Arial"/>
+                <a:ea typeface="Arial"/>
+                <a:cs typeface="Arial"/>
+                <a:sym typeface="Arial"/>
+              </a:rPr>
+            </a:br>
+            <a:r>
+              <a:rPr lang="en-US" sz="1400" b="0" dirty="0">
+                <a:latin typeface="Arial"/>
+                <a:ea typeface="Arial"/>
+                <a:cs typeface="Arial"/>
+                <a:sym typeface="Arial"/>
+              </a:rPr>
+              <a:t>- Calculate TARGET variable</a:t>
             </a:r>
             <a:br>
               <a:rPr lang="en-US" sz="1400" b="0" dirty="0">
@@ -10516,7 +11496,7 @@
 </p:sld>
 </file>
 
-<file path=ppt/slides/slide5.xml><?xml version="1.0" encoding="utf-8"?>
+<file path=ppt/slides/slide6.xml><?xml version="1.0" encoding="utf-8"?>
 <p:sld xmlns:a="http://schemas.openxmlformats.org/drawingml/2006/main" xmlns:r="http://schemas.openxmlformats.org/officeDocument/2006/relationships" xmlns:p="http://schemas.openxmlformats.org/presentationml/2006/main">
   <p:cSld>
     <p:spTree>
@@ -10632,15 +11612,7 @@
             </a:pPr>
             <a:r>
               <a:rPr lang="en-US" sz="1200" b="1" dirty="0"/>
-              <a:t>We have </a:t>
-            </a:r>
-            <a:r>
-              <a:rPr lang="en-US" sz="1200" b="1" dirty="0" err="1"/>
-              <a:t>ourselve</a:t>
-            </a:r>
-            <a:r>
-              <a:rPr lang="en-US" sz="1200" b="1" dirty="0"/>
-              <a:t> 4 customers segments with different characteristics:</a:t>
+              <a:t>We have ourselves 4 customers segments with different characteristics:</a:t>
             </a:r>
           </a:p>
           <a:p>
@@ -10788,7 +11760,7 @@
 </p:sld>
 </file>
 
-<file path=ppt/slides/slide6.xml><?xml version="1.0" encoding="utf-8"?>
+<file path=ppt/slides/slide7.xml><?xml version="1.0" encoding="utf-8"?>
 <p:sld xmlns:a="http://schemas.openxmlformats.org/drawingml/2006/main" xmlns:r="http://schemas.openxmlformats.org/officeDocument/2006/relationships" xmlns:p="http://schemas.openxmlformats.org/presentationml/2006/main">
   <p:cSld>
     <p:spTree>
@@ -10974,53 +11946,6 @@
           <a:xfrm>
             <a:off x="1847423" y="697654"/>
             <a:ext cx="4519509" cy="1428750"/>
-          </a:xfrm>
-          <a:prstGeom prst="rect">
-            <a:avLst/>
-          </a:prstGeom>
-          <a:noFill/>
-        </p:spPr>
-        <p:style>
-          <a:lnRef idx="2">
-            <a:schemeClr val="accent1">
-              <a:shade val="15000"/>
-            </a:schemeClr>
-          </a:lnRef>
-          <a:fillRef idx="1">
-            <a:schemeClr val="accent1"/>
-          </a:fillRef>
-          <a:effectRef idx="0">
-            <a:schemeClr val="accent1"/>
-          </a:effectRef>
-          <a:fontRef idx="minor">
-            <a:schemeClr val="lt1"/>
-          </a:fontRef>
-        </p:style>
-        <p:txBody>
-          <a:bodyPr rtlCol="0" anchor="ctr"/>
-          <a:lstStyle/>
-          <a:p>
-            <a:pPr algn="ctr"/>
-            <a:endParaRPr lang="en-GB"/>
-          </a:p>
-        </p:txBody>
-      </p:sp>
-      <p:sp>
-        <p:nvSpPr>
-          <p:cNvPr id="9" name="Rectangle 8">
-            <a:extLst>
-              <a:ext uri="{FF2B5EF4-FFF2-40B4-BE49-F238E27FC236}">
-                <a16:creationId xmlns:a16="http://schemas.microsoft.com/office/drawing/2014/main" id="{D5BB4C8A-0A07-FCAB-F513-ADC04106BBD8}"/>
-              </a:ext>
-            </a:extLst>
-          </p:cNvPr>
-          <p:cNvSpPr/>
-          <p:nvPr/>
-        </p:nvSpPr>
-        <p:spPr>
-          <a:xfrm>
-            <a:off x="277707" y="2302721"/>
-            <a:ext cx="3127694" cy="2641811"/>
           </a:xfrm>
           <a:prstGeom prst="rect">
             <a:avLst/>
@@ -11148,8 +12073,8 @@
         </p:nvSpPr>
         <p:spPr>
           <a:xfrm>
-            <a:off x="3638283" y="2302720"/>
-            <a:ext cx="5228009" cy="2641811"/>
+            <a:off x="160545" y="2302720"/>
+            <a:ext cx="8705748" cy="2641811"/>
           </a:xfrm>
           <a:prstGeom prst="rect">
             <a:avLst/>
@@ -11254,7 +12179,7 @@
 </p:sld>
 </file>
 
-<file path=ppt/slides/slide7.xml><?xml version="1.0" encoding="utf-8"?>
+<file path=ppt/slides/slide8.xml><?xml version="1.0" encoding="utf-8"?>
 <p:sld xmlns:a="http://schemas.openxmlformats.org/drawingml/2006/main" xmlns:r="http://schemas.openxmlformats.org/officeDocument/2006/relationships" xmlns:p="http://schemas.openxmlformats.org/presentationml/2006/main">
   <p:cSld>
     <p:spTree>
@@ -11753,7 +12678,7 @@
 </p:sld>
 </file>
 
-<file path=ppt/slides/slide8.xml><?xml version="1.0" encoding="utf-8"?>
+<file path=ppt/slides/slide9.xml><?xml version="1.0" encoding="utf-8"?>
 <p:sld xmlns:a="http://schemas.openxmlformats.org/drawingml/2006/main" xmlns:r="http://schemas.openxmlformats.org/officeDocument/2006/relationships" xmlns:p="http://schemas.openxmlformats.org/presentationml/2006/main">
   <p:cSld>
     <p:spTree>
@@ -11890,113 +12815,6 @@
         <p14:creationId xmlns:p14="http://schemas.microsoft.com/office/powerpoint/2010/main" val="2321067760"/>
       </p:ext>
     </p:extLst>
-  </p:cSld>
-  <p:clrMapOvr>
-    <a:masterClrMapping/>
-  </p:clrMapOvr>
-</p:sld>
-</file>
-
-<file path=ppt/slides/slide9.xml><?xml version="1.0" encoding="utf-8"?>
-<p:sld xmlns:a="http://schemas.openxmlformats.org/drawingml/2006/main" xmlns:r="http://schemas.openxmlformats.org/officeDocument/2006/relationships" xmlns:p="http://schemas.openxmlformats.org/presentationml/2006/main">
-  <p:cSld>
-    <p:spTree>
-      <p:nvGrpSpPr>
-        <p:cNvPr id="1" name="Shape 91"/>
-        <p:cNvGrpSpPr/>
-        <p:nvPr/>
-      </p:nvGrpSpPr>
-      <p:grpSpPr>
-        <a:xfrm>
-          <a:off x="0" y="0"/>
-          <a:ext cx="0" cy="0"/>
-          <a:chOff x="0" y="0"/>
-          <a:chExt cx="0" cy="0"/>
-        </a:xfrm>
-      </p:grpSpPr>
-      <p:sp>
-        <p:nvSpPr>
-          <p:cNvPr id="94" name="Google Shape;94;p14"/>
-          <p:cNvSpPr/>
-          <p:nvPr/>
-        </p:nvSpPr>
-        <p:spPr>
-          <a:xfrm>
-            <a:off x="215050" y="-5800"/>
-            <a:ext cx="6555900" cy="488100"/>
-          </a:xfrm>
-          <a:prstGeom prst="roundRect">
-            <a:avLst>
-              <a:gd name="adj" fmla="val 16667"/>
-            </a:avLst>
-          </a:prstGeom>
-          <a:solidFill>
-            <a:schemeClr val="lt2"/>
-          </a:solidFill>
-          <a:ln w="9525" cap="flat" cmpd="sng">
-            <a:solidFill>
-              <a:schemeClr val="dk2"/>
-            </a:solidFill>
-            <a:prstDash val="solid"/>
-            <a:round/>
-            <a:headEnd type="none" w="sm" len="sm"/>
-            <a:tailEnd type="none" w="sm" len="sm"/>
-          </a:ln>
-        </p:spPr>
-        <p:txBody>
-          <a:bodyPr spcFirstLastPara="1" wrap="square" lIns="91425" tIns="91425" rIns="91425" bIns="91425" anchor="ctr" anchorCtr="0">
-            <a:noAutofit/>
-          </a:bodyPr>
-          <a:lstStyle/>
-          <a:p>
-            <a:pPr marL="0" lvl="0" indent="0" algn="l" rtl="0">
-              <a:spcBef>
-                <a:spcPts val="0"/>
-              </a:spcBef>
-              <a:spcAft>
-                <a:spcPts val="0"/>
-              </a:spcAft>
-              <a:buNone/>
-            </a:pPr>
-            <a:r>
-              <a:rPr lang="en" sz="3000" b="1"/>
-              <a:t>Test-train split and scaling</a:t>
-            </a:r>
-            <a:endParaRPr sz="3000" b="1"/>
-          </a:p>
-        </p:txBody>
-      </p:sp>
-      <p:pic>
-        <p:nvPicPr>
-          <p:cNvPr id="3" name="Picture 2">
-            <a:extLst>
-              <a:ext uri="{FF2B5EF4-FFF2-40B4-BE49-F238E27FC236}">
-                <a16:creationId xmlns:a16="http://schemas.microsoft.com/office/drawing/2014/main" id="{225A1913-A256-9C96-0FBD-F0E4DD793FC1}"/>
-              </a:ext>
-            </a:extLst>
-          </p:cNvPr>
-          <p:cNvPicPr>
-            <a:picLocks noChangeAspect="1"/>
-          </p:cNvPicPr>
-          <p:nvPr/>
-        </p:nvPicPr>
-        <p:blipFill>
-          <a:blip r:embed="rId3"/>
-          <a:stretch>
-            <a:fillRect/>
-          </a:stretch>
-        </p:blipFill>
-        <p:spPr>
-          <a:xfrm>
-            <a:off x="1311734" y="1435945"/>
-            <a:ext cx="5373546" cy="3540053"/>
-          </a:xfrm>
-          <a:prstGeom prst="rect">
-            <a:avLst/>
-          </a:prstGeom>
-        </p:spPr>
-      </p:pic>
-    </p:spTree>
   </p:cSld>
   <p:clrMapOvr>
     <a:masterClrMapping/>

</xml_diff>